<commit_message>
finale Präsentation zur Abgabe_01
</commit_message>
<xml_diff>
--- a/Präsentation_Abgabe_01.pptx
+++ b/Präsentation_Abgabe_01.pptx
@@ -6,8 +6,8 @@
   </p:sldMasterIdLst>
   <p:sldIdLst>
     <p:sldId id="256" r:id="rId5"/>
-    <p:sldId id="267" r:id="rId6"/>
-    <p:sldId id="266" r:id="rId7"/>
+    <p:sldId id="266" r:id="rId6"/>
+    <p:sldId id="267" r:id="rId7"/>
     <p:sldId id="257" r:id="rId8"/>
     <p:sldId id="258" r:id="rId9"/>
     <p:sldId id="263" r:id="rId10"/>
@@ -126,7 +126,7 @@
 <file path=ppt/revisionInfo.xml><?xml version="1.0" encoding="utf-8"?>
 <p1510:revInfo xmlns:a="http://schemas.openxmlformats.org/drawingml/2006/main" xmlns:r="http://schemas.openxmlformats.org/officeDocument/2006/relationships" xmlns:p1510="http://schemas.microsoft.com/office/powerpoint/2015/10/main">
   <p1510:revLst>
-    <p1510:client id="{4C5D058F-F099-435B-AE61-20DD738C25B9}" v="4556" dt="2020-12-10T14:13:31.291"/>
+    <p1510:client id="{4C5D058F-F099-435B-AE61-20DD738C25B9}" v="4632" dt="2020-12-10T14:31:35.661"/>
     <p1510:client id="{AD39B487-8746-92FC-9C76-8D589F90E8F9}" v="149" dt="2020-12-10T13:57:52.645"/>
   </p1510:revLst>
 </p1510:revInfo>
@@ -371,8 +371,8 @@
   </pc:docChgLst>
   <pc:docChgLst>
     <pc:chgData name="Weinzierl, Michael (Michael)" userId="c56399cb-bc08-4410-86eb-6a478ea8c7a8" providerId="ADAL" clId="{4C5D058F-F099-435B-AE61-20DD738C25B9}"/>
-    <pc:docChg chg="undo custSel addSld modSld sldOrd">
-      <pc:chgData name="Weinzierl, Michael (Michael)" userId="c56399cb-bc08-4410-86eb-6a478ea8c7a8" providerId="ADAL" clId="{4C5D058F-F099-435B-AE61-20DD738C25B9}" dt="2020-12-10T14:13:31.291" v="4822" actId="207"/>
+    <pc:docChg chg="undo custSel addSld delSld modSld sldOrd">
+      <pc:chgData name="Weinzierl, Michael (Michael)" userId="c56399cb-bc08-4410-86eb-6a478ea8c7a8" providerId="ADAL" clId="{4C5D058F-F099-435B-AE61-20DD738C25B9}" dt="2020-12-10T14:31:35.652" v="4895" actId="20577"/>
       <pc:docMkLst>
         <pc:docMk/>
       </pc:docMkLst>
@@ -828,7 +828,7 @@
         </pc:cxnChg>
       </pc:sldChg>
       <pc:sldChg chg="modSp add">
-        <pc:chgData name="Weinzierl, Michael (Michael)" userId="c56399cb-bc08-4410-86eb-6a478ea8c7a8" providerId="ADAL" clId="{4C5D058F-F099-435B-AE61-20DD738C25B9}" dt="2020-12-08T10:51:16.068" v="4624" actId="20577"/>
+        <pc:chgData name="Weinzierl, Michael (Michael)" userId="c56399cb-bc08-4410-86eb-6a478ea8c7a8" providerId="ADAL" clId="{4C5D058F-F099-435B-AE61-20DD738C25B9}" dt="2020-12-10T14:31:35.652" v="4895" actId="20577"/>
         <pc:sldMkLst>
           <pc:docMk/>
           <pc:sldMk cId="1287432265" sldId="261"/>
@@ -842,7 +842,7 @@
           </ac:spMkLst>
         </pc:spChg>
         <pc:spChg chg="mod">
-          <ac:chgData name="Weinzierl, Michael (Michael)" userId="c56399cb-bc08-4410-86eb-6a478ea8c7a8" providerId="ADAL" clId="{4C5D058F-F099-435B-AE61-20DD738C25B9}" dt="2020-12-08T10:51:16.068" v="4624" actId="20577"/>
+          <ac:chgData name="Weinzierl, Michael (Michael)" userId="c56399cb-bc08-4410-86eb-6a478ea8c7a8" providerId="ADAL" clId="{4C5D058F-F099-435B-AE61-20DD738C25B9}" dt="2020-12-10T14:31:35.652" v="4895" actId="20577"/>
           <ac:spMkLst>
             <pc:docMk/>
             <pc:sldMk cId="1287432265" sldId="261"/>
@@ -1141,8 +1141,39 @@
           </ac:cxnSpMkLst>
         </pc:cxnChg>
       </pc:sldChg>
-      <pc:sldChg chg="addSp delSp modSp add setBg">
-        <pc:chgData name="Weinzierl, Michael (Michael)" userId="c56399cb-bc08-4410-86eb-6a478ea8c7a8" providerId="ADAL" clId="{4C5D058F-F099-435B-AE61-20DD738C25B9}" dt="2020-12-10T10:32:02.018" v="4645" actId="207"/>
+      <pc:sldChg chg="addSp delSp modSp add">
+        <pc:chgData name="Weinzierl, Michael (Michael)" userId="c56399cb-bc08-4410-86eb-6a478ea8c7a8" providerId="ADAL" clId="{4C5D058F-F099-435B-AE61-20DD738C25B9}" dt="2020-12-10T14:31:09.081" v="4868" actId="12788"/>
+        <pc:sldMkLst>
+          <pc:docMk/>
+          <pc:sldMk cId="1259751300" sldId="267"/>
+        </pc:sldMkLst>
+        <pc:spChg chg="del">
+          <ac:chgData name="Weinzierl, Michael (Michael)" userId="c56399cb-bc08-4410-86eb-6a478ea8c7a8" providerId="ADAL" clId="{4C5D058F-F099-435B-AE61-20DD738C25B9}" dt="2020-12-10T14:30:54.755" v="4831" actId="478"/>
+          <ac:spMkLst>
+            <pc:docMk/>
+            <pc:sldMk cId="1259751300" sldId="267"/>
+            <ac:spMk id="2" creationId="{6AEE2C1D-5F09-4366-995B-3F077D44EC45}"/>
+          </ac:spMkLst>
+        </pc:spChg>
+        <pc:spChg chg="del">
+          <ac:chgData name="Weinzierl, Michael (Michael)" userId="c56399cb-bc08-4410-86eb-6a478ea8c7a8" providerId="ADAL" clId="{4C5D058F-F099-435B-AE61-20DD738C25B9}" dt="2020-12-10T14:30:44.641" v="4825" actId="931"/>
+          <ac:spMkLst>
+            <pc:docMk/>
+            <pc:sldMk cId="1259751300" sldId="267"/>
+            <ac:spMk id="3" creationId="{6420AF3F-BAFA-4E1D-B44B-526B17E50A9E}"/>
+          </ac:spMkLst>
+        </pc:spChg>
+        <pc:picChg chg="add mod">
+          <ac:chgData name="Weinzierl, Michael (Michael)" userId="c56399cb-bc08-4410-86eb-6a478ea8c7a8" providerId="ADAL" clId="{4C5D058F-F099-435B-AE61-20DD738C25B9}" dt="2020-12-10T14:31:09.081" v="4868" actId="12788"/>
+          <ac:picMkLst>
+            <pc:docMk/>
+            <pc:sldMk cId="1259751300" sldId="267"/>
+            <ac:picMk id="5" creationId="{232D70F4-F964-442B-963B-D6825A405AB0}"/>
+          </ac:picMkLst>
+        </pc:picChg>
+      </pc:sldChg>
+      <pc:sldChg chg="addSp delSp modSp add del setBg">
+        <pc:chgData name="Weinzierl, Michael (Michael)" userId="c56399cb-bc08-4410-86eb-6a478ea8c7a8" providerId="ADAL" clId="{4C5D058F-F099-435B-AE61-20DD738C25B9}" dt="2020-12-10T14:17:24.326" v="4823" actId="2696"/>
         <pc:sldMkLst>
           <pc:docMk/>
           <pc:sldMk cId="2538649836" sldId="267"/>
@@ -9765,7 +9796,9 @@
         </p:nvSpPr>
         <p:spPr/>
         <p:txBody>
-          <a:bodyPr/>
+          <a:bodyPr>
+            <a:normAutofit fontScale="92500" lnSpcReduction="10000"/>
+          </a:bodyPr>
           <a:lstStyle/>
           <a:p>
             <a:r>
@@ -9807,6 +9840,36 @@
               </a:rPr>
               <a:t>https://www.clipartsfree.de/clipart-bilder-galerie/office-clipart-download/ampel-grafik-2445.html</a:t>
             </a:r>
+            <a:endParaRPr lang="de-DE"/>
+          </a:p>
+          <a:p>
+            <a:pPr marL="0" indent="0">
+              <a:buNone/>
+            </a:pPr>
+            <a:endParaRPr lang="de-DE"/>
+          </a:p>
+          <a:p>
+            <a:r>
+              <a:rPr lang="de-DE"/>
+              <a:t>Wo ist Walter:</a:t>
+            </a:r>
+          </a:p>
+          <a:p>
+            <a:pPr marL="0" indent="0">
+              <a:buNone/>
+            </a:pPr>
+            <a:r>
+              <a:rPr lang="de-DE">
+                <a:hlinkClick r:id="rId4"/>
+              </a:rPr>
+              <a:t>https://www.srf.ch/sendungen/einstein/fuenfmalklug/wo-ist-walter</a:t>
+            </a:r>
+            <a:endParaRPr lang="de-DE"/>
+          </a:p>
+          <a:p>
+            <a:pPr marL="0" indent="0">
+              <a:buNone/>
+            </a:pPr>
             <a:endParaRPr lang="de-DE"/>
           </a:p>
           <a:p>
@@ -9831,152 +9894,6 @@
 </file>
 
 <file path=ppt/slides/slide2.xml><?xml version="1.0" encoding="utf-8"?>
-<p:sld xmlns:a="http://schemas.openxmlformats.org/drawingml/2006/main" xmlns:r="http://schemas.openxmlformats.org/officeDocument/2006/relationships" xmlns:p="http://schemas.openxmlformats.org/presentationml/2006/main">
-  <p:cSld>
-    <p:bg>
-      <p:bgPr>
-        <a:solidFill>
-          <a:schemeClr val="tx1"/>
-        </a:solidFill>
-        <a:effectLst/>
-      </p:bgPr>
-    </p:bg>
-    <p:spTree>
-      <p:nvGrpSpPr>
-        <p:cNvPr id="1" name=""/>
-        <p:cNvGrpSpPr/>
-        <p:nvPr/>
-      </p:nvGrpSpPr>
-      <p:grpSpPr>
-        <a:xfrm>
-          <a:off x="0" y="0"/>
-          <a:ext cx="0" cy="0"/>
-          <a:chOff x="0" y="0"/>
-          <a:chExt cx="0" cy="0"/>
-        </a:xfrm>
-      </p:grpSpPr>
-      <p:sp>
-        <p:nvSpPr>
-          <p:cNvPr id="4" name="Titel 1">
-            <a:extLst>
-              <a:ext uri="{FF2B5EF4-FFF2-40B4-BE49-F238E27FC236}">
-                <a16:creationId xmlns:a16="http://schemas.microsoft.com/office/drawing/2014/main" id="{665CC9BE-3076-435C-9943-44BA009E2F45}"/>
-              </a:ext>
-            </a:extLst>
-          </p:cNvPr>
-          <p:cNvSpPr txBox="1">
-            <a:spLocks/>
-          </p:cNvSpPr>
-          <p:nvPr/>
-        </p:nvSpPr>
-        <p:spPr>
-          <a:xfrm>
-            <a:off x="2209800" y="4464028"/>
-            <a:ext cx="9144000" cy="1641490"/>
-          </a:xfrm>
-          <a:prstGeom prst="rect">
-            <a:avLst/>
-          </a:prstGeom>
-        </p:spPr>
-        <p:txBody>
-          <a:bodyPr vert="horz" lIns="91440" tIns="45720" rIns="91440" bIns="45720" rtlCol="0" anchor="ctr">
-            <a:normAutofit fontScale="85000" lnSpcReduction="10000"/>
-          </a:bodyPr>
-          <a:lstStyle>
-            <a:lvl1pPr algn="l" defTabSz="914400" rtl="0" eaLnBrk="1" latinLnBrk="0" hangingPunct="1">
-              <a:lnSpc>
-                <a:spcPct val="90000"/>
-              </a:lnSpc>
-              <a:spcBef>
-                <a:spcPct val="0"/>
-              </a:spcBef>
-              <a:buNone/>
-              <a:defRPr sz="5400" b="0" kern="1200">
-                <a:gradFill flip="none" rotWithShape="1">
-                  <a:gsLst>
-                    <a:gs pos="28000">
-                      <a:schemeClr val="tx1">
-                        <a:lumMod val="93000"/>
-                      </a:schemeClr>
-                    </a:gs>
-                    <a:gs pos="0">
-                      <a:schemeClr val="bg1">
-                        <a:lumMod val="25000"/>
-                        <a:lumOff val="75000"/>
-                      </a:schemeClr>
-                    </a:gs>
-                    <a:gs pos="100000">
-                      <a:schemeClr val="tx2">
-                        <a:lumMod val="0"/>
-                        <a:lumOff val="100000"/>
-                      </a:schemeClr>
-                    </a:gs>
-                  </a:gsLst>
-                  <a:lin ang="4800000" scaled="0"/>
-                  <a:tileRect/>
-                </a:gradFill>
-                <a:latin typeface="+mj-lt"/>
-                <a:ea typeface="+mj-ea"/>
-                <a:cs typeface="+mj-cs"/>
-              </a:defRPr>
-            </a:lvl1pPr>
-          </a:lstStyle>
-          <a:p>
-            <a:r>
-              <a:rPr lang="de-DE" sz="13800">
-                <a:solidFill>
-                  <a:schemeClr val="bg1"/>
-                </a:solidFill>
-              </a:rPr>
-              <a:t>Wo -Rona App</a:t>
-            </a:r>
-          </a:p>
-        </p:txBody>
-      </p:sp>
-      <p:pic>
-        <p:nvPicPr>
-          <p:cNvPr id="5" name="Grafik 4">
-            <a:extLst>
-              <a:ext uri="{FF2B5EF4-FFF2-40B4-BE49-F238E27FC236}">
-                <a16:creationId xmlns:a16="http://schemas.microsoft.com/office/drawing/2014/main" id="{A5616A32-EDA6-4713-85DE-EC3A420764A0}"/>
-              </a:ext>
-            </a:extLst>
-          </p:cNvPr>
-          <p:cNvPicPr>
-            <a:picLocks noChangeAspect="1"/>
-          </p:cNvPicPr>
-          <p:nvPr/>
-        </p:nvPicPr>
-        <p:blipFill>
-          <a:blip r:embed="rId2"/>
-          <a:stretch>
-            <a:fillRect/>
-          </a:stretch>
-        </p:blipFill>
-        <p:spPr>
-          <a:xfrm flipH="1">
-            <a:off x="3064849" y="4783368"/>
-            <a:ext cx="1757407" cy="878705"/>
-          </a:xfrm>
-          <a:prstGeom prst="rect">
-            <a:avLst/>
-          </a:prstGeom>
-        </p:spPr>
-      </p:pic>
-    </p:spTree>
-    <p:extLst>
-      <p:ext uri="{BB962C8B-B14F-4D97-AF65-F5344CB8AC3E}">
-        <p14:creationId xmlns:p14="http://schemas.microsoft.com/office/powerpoint/2010/main" val="2538649836"/>
-      </p:ext>
-    </p:extLst>
-  </p:cSld>
-  <p:clrMapOvr>
-    <a:masterClrMapping/>
-  </p:clrMapOvr>
-</p:sld>
-</file>
-
-<file path=ppt/slides/slide3.xml><?xml version="1.0" encoding="utf-8"?>
 <p:sld xmlns:a="http://schemas.openxmlformats.org/drawingml/2006/main" xmlns:r="http://schemas.openxmlformats.org/officeDocument/2006/relationships" xmlns:p="http://schemas.openxmlformats.org/presentationml/2006/main">
   <p:cSld>
     <p:spTree>
@@ -10598,6 +10515,65 @@
     <p:extLst>
       <p:ext uri="{BB962C8B-B14F-4D97-AF65-F5344CB8AC3E}">
         <p14:creationId xmlns:p14="http://schemas.microsoft.com/office/powerpoint/2010/main" val="2451742237"/>
+      </p:ext>
+    </p:extLst>
+  </p:cSld>
+  <p:clrMapOvr>
+    <a:masterClrMapping/>
+  </p:clrMapOvr>
+</p:sld>
+</file>
+
+<file path=ppt/slides/slide3.xml><?xml version="1.0" encoding="utf-8"?>
+<p:sld xmlns:a="http://schemas.openxmlformats.org/drawingml/2006/main" xmlns:r="http://schemas.openxmlformats.org/officeDocument/2006/relationships" xmlns:p="http://schemas.openxmlformats.org/presentationml/2006/main">
+  <p:cSld>
+    <p:spTree>
+      <p:nvGrpSpPr>
+        <p:cNvPr id="1" name=""/>
+        <p:cNvGrpSpPr/>
+        <p:nvPr/>
+      </p:nvGrpSpPr>
+      <p:grpSpPr>
+        <a:xfrm>
+          <a:off x="0" y="0"/>
+          <a:ext cx="0" cy="0"/>
+          <a:chOff x="0" y="0"/>
+          <a:chExt cx="0" cy="0"/>
+        </a:xfrm>
+      </p:grpSpPr>
+      <p:pic>
+        <p:nvPicPr>
+          <p:cNvPr id="5" name="Inhaltsplatzhalter 4" descr="Ein Bild, das Personen, Menge enthält.&#10;&#10;Automatisch generierte Beschreibung">
+            <a:extLst>
+              <a:ext uri="{FF2B5EF4-FFF2-40B4-BE49-F238E27FC236}">
+                <a16:creationId xmlns:a16="http://schemas.microsoft.com/office/drawing/2014/main" id="{232D70F4-F964-442B-963B-D6825A405AB0}"/>
+              </a:ext>
+            </a:extLst>
+          </p:cNvPr>
+          <p:cNvPicPr>
+            <a:picLocks noGrp="1" noChangeAspect="1"/>
+          </p:cNvPicPr>
+          <p:nvPr>
+            <p:ph idx="1"/>
+          </p:nvPr>
+        </p:nvPicPr>
+        <p:blipFill>
+          <a:blip r:embed="rId2"/>
+          <a:stretch>
+            <a:fillRect/>
+          </a:stretch>
+        </p:blipFill>
+        <p:spPr>
+          <a:xfrm>
+            <a:off x="1920216" y="216859"/>
+            <a:ext cx="8351569" cy="6424283"/>
+          </a:xfrm>
+        </p:spPr>
+      </p:pic>
+    </p:spTree>
+    <p:extLst>
+      <p:ext uri="{BB962C8B-B14F-4D97-AF65-F5344CB8AC3E}">
+        <p14:creationId xmlns:p14="http://schemas.microsoft.com/office/powerpoint/2010/main" val="1259751300"/>
       </p:ext>
     </p:extLst>
   </p:cSld>
@@ -14944,12 +14920,6 @@
 </file>
 
 <file path=customXml/item1.xml><?xml version="1.0" encoding="utf-8"?>
-<p:properties xmlns:p="http://schemas.microsoft.com/office/2006/metadata/properties" xmlns:xsi="http://www.w3.org/2001/XMLSchema-instance" xmlns:pc="http://schemas.microsoft.com/office/infopath/2007/PartnerControls">
-  <documentManagement/>
-</p:properties>
-</file>
-
-<file path=customXml/item2.xml><?xml version="1.0" encoding="utf-8"?>
 <ct:contentTypeSchema xmlns:ct="http://schemas.microsoft.com/office/2006/metadata/contentType" xmlns:ma="http://schemas.microsoft.com/office/2006/metadata/properties/metaAttributes" ct:_="" ma:_="" ma:contentTypeName="Document" ma:contentTypeID="0x0101005881C68DFECA294BAFB9C2A20253348D" ma:contentTypeVersion="7" ma:contentTypeDescription="Create a new document." ma:contentTypeScope="" ma:versionID="a1000d78e42e1d130e99588db7ba6bd3">
   <xsd:schema xmlns:xsd="http://www.w3.org/2001/XMLSchema" xmlns:xs="http://www.w3.org/2001/XMLSchema" xmlns:p="http://schemas.microsoft.com/office/2006/metadata/properties" xmlns:ns3="e6e64ce4-7c6a-4ef1-ac8e-b34e405a6a8a" targetNamespace="http://schemas.microsoft.com/office/2006/metadata/properties" ma:root="true" ma:fieldsID="92c363ec9ae73272d4d223d49e2bbdee" ns3:_="">
     <xsd:import namespace="e6e64ce4-7c6a-4ef1-ac8e-b34e405a6a8a"/>
@@ -15113,7 +15083,7 @@
 </ct:contentTypeSchema>
 </file>
 
-<file path=customXml/item3.xml><?xml version="1.0" encoding="utf-8"?>
+<file path=customXml/item2.xml><?xml version="1.0" encoding="utf-8"?>
 <?mso-contentType ?>
 <FormTemplates xmlns="http://schemas.microsoft.com/sharepoint/v3/contenttype/forms">
   <Display>DocumentLibraryForm</Display>
@@ -15122,23 +15092,13 @@
 </FormTemplates>
 </file>
 
-<file path=customXml/itemProps1.xml><?xml version="1.0" encoding="utf-8"?>
-<ds:datastoreItem xmlns:ds="http://schemas.openxmlformats.org/officeDocument/2006/customXml" ds:itemID="{332DB522-6533-4187-AAA8-62641BD5F68D}">
-  <ds:schemaRefs>
-    <ds:schemaRef ds:uri="e6e64ce4-7c6a-4ef1-ac8e-b34e405a6a8a"/>
-    <ds:schemaRef ds:uri="http://purl.org/dc/dcmitype/"/>
-    <ds:schemaRef ds:uri="http://purl.org/dc/elements/1.1/"/>
-    <ds:schemaRef ds:uri="http://purl.org/dc/terms/"/>
-    <ds:schemaRef ds:uri="http://schemas.microsoft.com/office/2006/documentManagement/types"/>
-    <ds:schemaRef ds:uri="http://schemas.microsoft.com/office/2006/metadata/properties"/>
-    <ds:schemaRef ds:uri="http://schemas.microsoft.com/office/infopath/2007/PartnerControls"/>
-    <ds:schemaRef ds:uri="http://schemas.openxmlformats.org/package/2006/metadata/core-properties"/>
-    <ds:schemaRef ds:uri="http://www.w3.org/XML/1998/namespace"/>
-  </ds:schemaRefs>
-</ds:datastoreItem>
+<file path=customXml/item3.xml><?xml version="1.0" encoding="utf-8"?>
+<p:properties xmlns:p="http://schemas.microsoft.com/office/2006/metadata/properties" xmlns:xsi="http://www.w3.org/2001/XMLSchema-instance" xmlns:pc="http://schemas.microsoft.com/office/infopath/2007/PartnerControls">
+  <documentManagement/>
+</p:properties>
 </file>
 
-<file path=customXml/itemProps2.xml><?xml version="1.0" encoding="utf-8"?>
+<file path=customXml/itemProps1.xml><?xml version="1.0" encoding="utf-8"?>
 <ds:datastoreItem xmlns:ds="http://schemas.openxmlformats.org/officeDocument/2006/customXml" ds:itemID="{1721BF1E-DCC3-43DE-947F-F9A2DDEC3F80}">
   <ds:schemaRefs>
     <ds:schemaRef ds:uri="e6e64ce4-7c6a-4ef1-ac8e-b34e405a6a8a"/>
@@ -15156,10 +15116,26 @@
 </ds:datastoreItem>
 </file>
 
-<file path=customXml/itemProps3.xml><?xml version="1.0" encoding="utf-8"?>
+<file path=customXml/itemProps2.xml><?xml version="1.0" encoding="utf-8"?>
 <ds:datastoreItem xmlns:ds="http://schemas.openxmlformats.org/officeDocument/2006/customXml" ds:itemID="{E14FEB30-9FE9-4CA8-B96B-3470DE7FF7B1}">
   <ds:schemaRefs>
     <ds:schemaRef ds:uri="http://schemas.microsoft.com/sharepoint/v3/contenttype/forms"/>
   </ds:schemaRefs>
 </ds:datastoreItem>
+</file>
+
+<file path=customXml/itemProps3.xml><?xml version="1.0" encoding="utf-8"?>
+<ds:datastoreItem xmlns:ds="http://schemas.openxmlformats.org/officeDocument/2006/customXml" ds:itemID="{332DB522-6533-4187-AAA8-62641BD5F68D}">
+  <ds:schemaRefs>
+    <ds:schemaRef ds:uri="e6e64ce4-7c6a-4ef1-ac8e-b34e405a6a8a"/>
+    <ds:schemaRef ds:uri="http://purl.org/dc/dcmitype/"/>
+    <ds:schemaRef ds:uri="http://purl.org/dc/elements/1.1/"/>
+    <ds:schemaRef ds:uri="http://purl.org/dc/terms/"/>
+    <ds:schemaRef ds:uri="http://schemas.microsoft.com/office/2006/documentManagement/types"/>
+    <ds:schemaRef ds:uri="http://schemas.microsoft.com/office/2006/metadata/properties"/>
+    <ds:schemaRef ds:uri="http://schemas.microsoft.com/office/infopath/2007/PartnerControls"/>
+    <ds:schemaRef ds:uri="http://schemas.openxmlformats.org/package/2006/metadata/core-properties"/>
+    <ds:schemaRef ds:uri="http://www.w3.org/XML/1998/namespace"/>
+  </ds:schemaRefs>
+</ds:datastoreItem>
 </file>
</xml_diff>